<commit_message>
Quali - mudança ortográfica na apresentação
</commit_message>
<xml_diff>
--- a/1-Meus-Artigos/Qualificacao/apresentação.pptx
+++ b/1-Meus-Artigos/Qualificacao/apresentação.pptx
@@ -2810,6 +2810,13 @@
         </dgm:presLayoutVars>
       </dgm:prSet>
       <dgm:spPr/>
+      <dgm:t>
+        <a:bodyPr/>
+        <a:lstStyle/>
+        <a:p>
+          <a:endParaRPr lang="pt-BR"/>
+        </a:p>
+      </dgm:t>
     </dgm:pt>
     <dgm:pt modelId="{807D473F-1CF3-47D8-B9DA-0CDCBE173537}" type="pres">
       <dgm:prSet presAssocID="{A32FD129-6951-4DA3-AA90-F3C05BC06034}" presName="hierRoot1" presStyleCnt="0">
@@ -2830,10 +2837,24 @@
         </dgm:presLayoutVars>
       </dgm:prSet>
       <dgm:spPr/>
+      <dgm:t>
+        <a:bodyPr/>
+        <a:lstStyle/>
+        <a:p>
+          <a:endParaRPr lang="pt-BR"/>
+        </a:p>
+      </dgm:t>
     </dgm:pt>
     <dgm:pt modelId="{64B7FFAB-DB58-4496-BD6D-66B80A109E4B}" type="pres">
       <dgm:prSet presAssocID="{A32FD129-6951-4DA3-AA90-F3C05BC06034}" presName="rootConnector1" presStyleLbl="node1" presStyleIdx="0" presStyleCnt="0"/>
       <dgm:spPr/>
+      <dgm:t>
+        <a:bodyPr/>
+        <a:lstStyle/>
+        <a:p>
+          <a:endParaRPr lang="pt-BR"/>
+        </a:p>
+      </dgm:t>
     </dgm:pt>
     <dgm:pt modelId="{29D47FBA-67AA-4452-AE48-374C3F39DDB8}" type="pres">
       <dgm:prSet presAssocID="{A32FD129-6951-4DA3-AA90-F3C05BC06034}" presName="hierChild2" presStyleCnt="0"/>
@@ -2842,6 +2863,13 @@
     <dgm:pt modelId="{B339D220-7BC0-4E8D-89F9-55EDE464832D}" type="pres">
       <dgm:prSet presAssocID="{487E4310-5651-4700-A39E-2AEC0EA9F67D}" presName="Name64" presStyleLbl="parChTrans1D2" presStyleIdx="0" presStyleCnt="1"/>
       <dgm:spPr/>
+      <dgm:t>
+        <a:bodyPr/>
+        <a:lstStyle/>
+        <a:p>
+          <a:endParaRPr lang="pt-BR"/>
+        </a:p>
+      </dgm:t>
     </dgm:pt>
     <dgm:pt modelId="{3C0A1E83-22F8-44C0-ACEC-5809374F669B}" type="pres">
       <dgm:prSet presAssocID="{00F27E76-D053-4838-B0FC-ECD625A2F185}" presName="hierRoot2" presStyleCnt="0">
@@ -2862,10 +2890,24 @@
         </dgm:presLayoutVars>
       </dgm:prSet>
       <dgm:spPr/>
+      <dgm:t>
+        <a:bodyPr/>
+        <a:lstStyle/>
+        <a:p>
+          <a:endParaRPr lang="pt-BR"/>
+        </a:p>
+      </dgm:t>
     </dgm:pt>
     <dgm:pt modelId="{CC8CC60C-3915-44D5-839B-F30D4D658A7D}" type="pres">
       <dgm:prSet presAssocID="{00F27E76-D053-4838-B0FC-ECD625A2F185}" presName="rootConnector" presStyleLbl="node2" presStyleIdx="0" presStyleCnt="1"/>
       <dgm:spPr/>
+      <dgm:t>
+        <a:bodyPr/>
+        <a:lstStyle/>
+        <a:p>
+          <a:endParaRPr lang="pt-BR"/>
+        </a:p>
+      </dgm:t>
     </dgm:pt>
     <dgm:pt modelId="{FD349C28-8656-4075-8274-2B5D1070A7CE}" type="pres">
       <dgm:prSet presAssocID="{00F27E76-D053-4838-B0FC-ECD625A2F185}" presName="hierChild4" presStyleCnt="0"/>
@@ -2874,6 +2916,13 @@
     <dgm:pt modelId="{E2E01032-55EC-4490-A2E2-EAE58D3C5B9E}" type="pres">
       <dgm:prSet presAssocID="{7F290ED6-4613-4839-8B5C-6BBBC2E74564}" presName="Name64" presStyleLbl="parChTrans1D3" presStyleIdx="0" presStyleCnt="2"/>
       <dgm:spPr/>
+      <dgm:t>
+        <a:bodyPr/>
+        <a:lstStyle/>
+        <a:p>
+          <a:endParaRPr lang="pt-BR"/>
+        </a:p>
+      </dgm:t>
     </dgm:pt>
     <dgm:pt modelId="{EF8B771D-E79F-41D3-9416-A6D15BC61C04}" type="pres">
       <dgm:prSet presAssocID="{120B4DC1-BE43-44CA-BAC8-D47AFD74228A}" presName="hierRoot2" presStyleCnt="0">
@@ -2894,10 +2943,24 @@
         </dgm:presLayoutVars>
       </dgm:prSet>
       <dgm:spPr/>
+      <dgm:t>
+        <a:bodyPr/>
+        <a:lstStyle/>
+        <a:p>
+          <a:endParaRPr lang="pt-BR"/>
+        </a:p>
+      </dgm:t>
     </dgm:pt>
     <dgm:pt modelId="{8BA48D2F-6A6C-411C-8D81-7633043C1F47}" type="pres">
       <dgm:prSet presAssocID="{120B4DC1-BE43-44CA-BAC8-D47AFD74228A}" presName="rootConnector" presStyleLbl="node3" presStyleIdx="0" presStyleCnt="2"/>
       <dgm:spPr/>
+      <dgm:t>
+        <a:bodyPr/>
+        <a:lstStyle/>
+        <a:p>
+          <a:endParaRPr lang="pt-BR"/>
+        </a:p>
+      </dgm:t>
     </dgm:pt>
     <dgm:pt modelId="{F31EA066-FB38-48C2-BBF7-4300822904AE}" type="pres">
       <dgm:prSet presAssocID="{120B4DC1-BE43-44CA-BAC8-D47AFD74228A}" presName="hierChild4" presStyleCnt="0"/>
@@ -2906,6 +2969,13 @@
     <dgm:pt modelId="{3D7F2BD7-EEFA-4A09-BAAA-A5467747A5B4}" type="pres">
       <dgm:prSet presAssocID="{08AE8121-44A9-49E7-BB6A-8CDCF1FE8595}" presName="Name64" presStyleLbl="parChTrans1D4" presStyleIdx="0" presStyleCnt="3"/>
       <dgm:spPr/>
+      <dgm:t>
+        <a:bodyPr/>
+        <a:lstStyle/>
+        <a:p>
+          <a:endParaRPr lang="pt-BR"/>
+        </a:p>
+      </dgm:t>
     </dgm:pt>
     <dgm:pt modelId="{10800730-FAA3-4D4E-8B0C-8664288D66FC}" type="pres">
       <dgm:prSet presAssocID="{3A52C428-20B3-4453-BFAF-58617BB8395D}" presName="hierRoot2" presStyleCnt="0">
@@ -2937,6 +3007,13 @@
     <dgm:pt modelId="{94F5AD06-8B95-4DCB-B3FF-3FA8EF8C8165}" type="pres">
       <dgm:prSet presAssocID="{3A52C428-20B3-4453-BFAF-58617BB8395D}" presName="rootConnector" presStyleLbl="node4" presStyleIdx="0" presStyleCnt="3"/>
       <dgm:spPr/>
+      <dgm:t>
+        <a:bodyPr/>
+        <a:lstStyle/>
+        <a:p>
+          <a:endParaRPr lang="pt-BR"/>
+        </a:p>
+      </dgm:t>
     </dgm:pt>
     <dgm:pt modelId="{7A962AA2-C487-40E3-ABFA-C27E1AA07D6C}" type="pres">
       <dgm:prSet presAssocID="{3A52C428-20B3-4453-BFAF-58617BB8395D}" presName="hierChild4" presStyleCnt="0"/>
@@ -2949,6 +3026,13 @@
     <dgm:pt modelId="{9EFA87BC-94BA-4C59-98FE-454448B4BC0E}" type="pres">
       <dgm:prSet presAssocID="{BB9CE1AE-D568-45CE-A149-FD4F224AD884}" presName="Name64" presStyleLbl="parChTrans1D4" presStyleIdx="1" presStyleCnt="3"/>
       <dgm:spPr/>
+      <dgm:t>
+        <a:bodyPr/>
+        <a:lstStyle/>
+        <a:p>
+          <a:endParaRPr lang="pt-BR"/>
+        </a:p>
+      </dgm:t>
     </dgm:pt>
     <dgm:pt modelId="{2613E132-4BA8-4454-B025-69D2A089BFFB}" type="pres">
       <dgm:prSet presAssocID="{442470E5-8E81-4C87-BE58-2EE5B111A966}" presName="hierRoot2" presStyleCnt="0">
@@ -2969,10 +3053,24 @@
         </dgm:presLayoutVars>
       </dgm:prSet>
       <dgm:spPr/>
+      <dgm:t>
+        <a:bodyPr/>
+        <a:lstStyle/>
+        <a:p>
+          <a:endParaRPr lang="pt-BR"/>
+        </a:p>
+      </dgm:t>
     </dgm:pt>
     <dgm:pt modelId="{74BDAF2C-A37D-41F2-BFC4-301D18D193AB}" type="pres">
       <dgm:prSet presAssocID="{442470E5-8E81-4C87-BE58-2EE5B111A966}" presName="rootConnector" presStyleLbl="node4" presStyleIdx="1" presStyleCnt="3"/>
       <dgm:spPr/>
+      <dgm:t>
+        <a:bodyPr/>
+        <a:lstStyle/>
+        <a:p>
+          <a:endParaRPr lang="pt-BR"/>
+        </a:p>
+      </dgm:t>
     </dgm:pt>
     <dgm:pt modelId="{84513FE5-78AE-4D7A-BB57-254EB85601D2}" type="pres">
       <dgm:prSet presAssocID="{442470E5-8E81-4C87-BE58-2EE5B111A966}" presName="hierChild4" presStyleCnt="0"/>
@@ -2989,6 +3087,13 @@
     <dgm:pt modelId="{69541900-6A79-4139-8AA7-BCAF9BC48D16}" type="pres">
       <dgm:prSet presAssocID="{D9DA6E55-9A37-4AE6-AA38-4292EDC51FBE}" presName="Name64" presStyleLbl="parChTrans1D3" presStyleIdx="1" presStyleCnt="2"/>
       <dgm:spPr/>
+      <dgm:t>
+        <a:bodyPr/>
+        <a:lstStyle/>
+        <a:p>
+          <a:endParaRPr lang="pt-BR"/>
+        </a:p>
+      </dgm:t>
     </dgm:pt>
     <dgm:pt modelId="{51BA6E4A-9B27-4126-99A7-F51D3A788633}" type="pres">
       <dgm:prSet presAssocID="{074180C9-AA60-4E57-A9E5-27EE30923DF8}" presName="hierRoot2" presStyleCnt="0">
@@ -3009,10 +3114,24 @@
         </dgm:presLayoutVars>
       </dgm:prSet>
       <dgm:spPr/>
+      <dgm:t>
+        <a:bodyPr/>
+        <a:lstStyle/>
+        <a:p>
+          <a:endParaRPr lang="pt-BR"/>
+        </a:p>
+      </dgm:t>
     </dgm:pt>
     <dgm:pt modelId="{BCCD1092-6C7C-4334-929F-60511043A205}" type="pres">
       <dgm:prSet presAssocID="{074180C9-AA60-4E57-A9E5-27EE30923DF8}" presName="rootConnector" presStyleLbl="node3" presStyleIdx="1" presStyleCnt="2"/>
       <dgm:spPr/>
+      <dgm:t>
+        <a:bodyPr/>
+        <a:lstStyle/>
+        <a:p>
+          <a:endParaRPr lang="pt-BR"/>
+        </a:p>
+      </dgm:t>
     </dgm:pt>
     <dgm:pt modelId="{EBD65297-E396-4EC3-8986-8140B86E3629}" type="pres">
       <dgm:prSet presAssocID="{074180C9-AA60-4E57-A9E5-27EE30923DF8}" presName="hierChild4" presStyleCnt="0"/>
@@ -3021,6 +3140,13 @@
     <dgm:pt modelId="{866D1971-0D1B-4602-AC13-75E3B5D1B981}" type="pres">
       <dgm:prSet presAssocID="{075AE697-E1A9-4658-8586-5D55C7F7D836}" presName="Name64" presStyleLbl="parChTrans1D4" presStyleIdx="2" presStyleCnt="3"/>
       <dgm:spPr/>
+      <dgm:t>
+        <a:bodyPr/>
+        <a:lstStyle/>
+        <a:p>
+          <a:endParaRPr lang="pt-BR"/>
+        </a:p>
+      </dgm:t>
     </dgm:pt>
     <dgm:pt modelId="{78C661BE-96CA-46AF-867B-9F53E107DBA1}" type="pres">
       <dgm:prSet presAssocID="{5B9CD8AB-CA1C-4C3C-B5D8-A1890CEB0195}" presName="hierRoot2" presStyleCnt="0">
@@ -3041,10 +3167,24 @@
         </dgm:presLayoutVars>
       </dgm:prSet>
       <dgm:spPr/>
+      <dgm:t>
+        <a:bodyPr/>
+        <a:lstStyle/>
+        <a:p>
+          <a:endParaRPr lang="pt-BR"/>
+        </a:p>
+      </dgm:t>
     </dgm:pt>
     <dgm:pt modelId="{A6C869B9-5992-48C0-80E2-751984EC983A}" type="pres">
       <dgm:prSet presAssocID="{5B9CD8AB-CA1C-4C3C-B5D8-A1890CEB0195}" presName="rootConnector" presStyleLbl="node4" presStyleIdx="2" presStyleCnt="3"/>
       <dgm:spPr/>
+      <dgm:t>
+        <a:bodyPr/>
+        <a:lstStyle/>
+        <a:p>
+          <a:endParaRPr lang="pt-BR"/>
+        </a:p>
+      </dgm:t>
     </dgm:pt>
     <dgm:pt modelId="{760CA83D-2665-436D-B401-7E54A172D3E5}" type="pres">
       <dgm:prSet presAssocID="{5B9CD8AB-CA1C-4C3C-B5D8-A1890CEB0195}" presName="hierChild4" presStyleCnt="0"/>
@@ -3068,34 +3208,34 @@
     </dgm:pt>
   </dgm:ptLst>
   <dgm:cxnLst>
+    <dgm:cxn modelId="{24AE312D-8A46-41B5-B693-7A4D682E63A1}" srcId="{750F83C2-2489-4726-9F9E-35A74BCAC319}" destId="{A32FD129-6951-4DA3-AA90-F3C05BC06034}" srcOrd="0" destOrd="0" parTransId="{16209A0E-84FC-46DC-AE6A-BE9F605141B0}" sibTransId="{A454572B-D4CD-4F98-9279-7773859EB7DF}"/>
+    <dgm:cxn modelId="{C96574FF-FC97-4C58-BFEE-CBB6BB450305}" srcId="{120B4DC1-BE43-44CA-BAC8-D47AFD74228A}" destId="{442470E5-8E81-4C87-BE58-2EE5B111A966}" srcOrd="1" destOrd="0" parTransId="{BB9CE1AE-D568-45CE-A149-FD4F224AD884}" sibTransId="{046D4732-B754-4B4F-BAAC-57C4FCE30E20}"/>
+    <dgm:cxn modelId="{1712698E-0FA3-4A45-85C7-909D09CB1621}" srcId="{00F27E76-D053-4838-B0FC-ECD625A2F185}" destId="{074180C9-AA60-4E57-A9E5-27EE30923DF8}" srcOrd="1" destOrd="0" parTransId="{D9DA6E55-9A37-4AE6-AA38-4292EDC51FBE}" sibTransId="{F18C376F-9DFA-471C-AE57-168BA656B570}"/>
+    <dgm:cxn modelId="{24245CF5-B0FA-40FE-BB72-F2924EE618DC}" type="presOf" srcId="{5B9CD8AB-CA1C-4C3C-B5D8-A1890CEB0195}" destId="{A6C869B9-5992-48C0-80E2-751984EC983A}" srcOrd="1" destOrd="0" presId="urn:microsoft.com/office/officeart/2009/3/layout/HorizontalOrganizationChart"/>
+    <dgm:cxn modelId="{180E994A-53B6-464E-838C-A3D8F2DE78C7}" type="presOf" srcId="{5B9CD8AB-CA1C-4C3C-B5D8-A1890CEB0195}" destId="{4B0C367F-7037-4653-AA15-D06435589E37}" srcOrd="0" destOrd="0" presId="urn:microsoft.com/office/officeart/2009/3/layout/HorizontalOrganizationChart"/>
+    <dgm:cxn modelId="{98ED4D4E-A5C6-43DD-A367-647B5A6958A7}" srcId="{120B4DC1-BE43-44CA-BAC8-D47AFD74228A}" destId="{3A52C428-20B3-4453-BFAF-58617BB8395D}" srcOrd="0" destOrd="0" parTransId="{08AE8121-44A9-49E7-BB6A-8CDCF1FE8595}" sibTransId="{C598FDE5-7F6A-4E58-B919-2135218176CC}"/>
+    <dgm:cxn modelId="{E676DA69-5D24-4E9F-A733-E98B100DF40E}" srcId="{00F27E76-D053-4838-B0FC-ECD625A2F185}" destId="{120B4DC1-BE43-44CA-BAC8-D47AFD74228A}" srcOrd="0" destOrd="0" parTransId="{7F290ED6-4613-4839-8B5C-6BBBC2E74564}" sibTransId="{E30ADA23-9AE4-4A79-92C7-7CFE72E8B3D0}"/>
+    <dgm:cxn modelId="{9A5E58E3-1829-4193-AE75-381B3405552E}" type="presOf" srcId="{120B4DC1-BE43-44CA-BAC8-D47AFD74228A}" destId="{2C6C9DA7-D985-4E9A-B607-56D60461266A}" srcOrd="0" destOrd="0" presId="urn:microsoft.com/office/officeart/2009/3/layout/HorizontalOrganizationChart"/>
+    <dgm:cxn modelId="{3A745549-F83F-4C1E-8ADB-700683B7ABBF}" type="presOf" srcId="{120B4DC1-BE43-44CA-BAC8-D47AFD74228A}" destId="{8BA48D2F-6A6C-411C-8D81-7633043C1F47}" srcOrd="1" destOrd="0" presId="urn:microsoft.com/office/officeart/2009/3/layout/HorizontalOrganizationChart"/>
+    <dgm:cxn modelId="{B9F44E6C-971B-42DE-BDAF-6C951BBB42A5}" type="presOf" srcId="{D9DA6E55-9A37-4AE6-AA38-4292EDC51FBE}" destId="{69541900-6A79-4139-8AA7-BCAF9BC48D16}" srcOrd="0" destOrd="0" presId="urn:microsoft.com/office/officeart/2009/3/layout/HorizontalOrganizationChart"/>
+    <dgm:cxn modelId="{C38329A7-A1A2-4DCF-B825-6A994C25B4D0}" srcId="{A32FD129-6951-4DA3-AA90-F3C05BC06034}" destId="{00F27E76-D053-4838-B0FC-ECD625A2F185}" srcOrd="0" destOrd="0" parTransId="{487E4310-5651-4700-A39E-2AEC0EA9F67D}" sibTransId="{9F343612-9E05-4E74-9BB0-0F127CCEA8D2}"/>
+    <dgm:cxn modelId="{F8B73CB3-B3B5-47B1-A314-3DBDCAF97614}" type="presOf" srcId="{A32FD129-6951-4DA3-AA90-F3C05BC06034}" destId="{64B7FFAB-DB58-4496-BD6D-66B80A109E4B}" srcOrd="1" destOrd="0" presId="urn:microsoft.com/office/officeart/2009/3/layout/HorizontalOrganizationChart"/>
     <dgm:cxn modelId="{D8933272-8540-40DA-984A-4A932C341647}" type="presOf" srcId="{750F83C2-2489-4726-9F9E-35A74BCAC319}" destId="{7A3CB1A1-112F-4DDF-BD1C-3E83DBE185B0}" srcOrd="0" destOrd="0" presId="urn:microsoft.com/office/officeart/2009/3/layout/HorizontalOrganizationChart"/>
+    <dgm:cxn modelId="{36799FF1-4F07-4E50-BFC0-4FC79FB269CF}" type="presOf" srcId="{A32FD129-6951-4DA3-AA90-F3C05BC06034}" destId="{56E76F2F-7431-42E1-ACCC-02B79A77D018}" srcOrd="0" destOrd="0" presId="urn:microsoft.com/office/officeart/2009/3/layout/HorizontalOrganizationChart"/>
+    <dgm:cxn modelId="{4B3D9C0E-4A50-4C2C-B807-F60C5CDFC7FB}" type="presOf" srcId="{075AE697-E1A9-4658-8586-5D55C7F7D836}" destId="{866D1971-0D1B-4602-AC13-75E3B5D1B981}" srcOrd="0" destOrd="0" presId="urn:microsoft.com/office/officeart/2009/3/layout/HorizontalOrganizationChart"/>
+    <dgm:cxn modelId="{D6520D39-3530-469E-AD59-70CDE683966F}" srcId="{074180C9-AA60-4E57-A9E5-27EE30923DF8}" destId="{5B9CD8AB-CA1C-4C3C-B5D8-A1890CEB0195}" srcOrd="0" destOrd="0" parTransId="{075AE697-E1A9-4658-8586-5D55C7F7D836}" sibTransId="{2B0D433A-76F3-4840-AF85-E0766D3DB483}"/>
+    <dgm:cxn modelId="{C8F10E01-8A0F-4C8C-BD75-BB7C33D93F42}" type="presOf" srcId="{08AE8121-44A9-49E7-BB6A-8CDCF1FE8595}" destId="{3D7F2BD7-EEFA-4A09-BAAA-A5467747A5B4}" srcOrd="0" destOrd="0" presId="urn:microsoft.com/office/officeart/2009/3/layout/HorizontalOrganizationChart"/>
+    <dgm:cxn modelId="{01EF61B2-E395-4461-A90A-73B360DABC97}" type="presOf" srcId="{074180C9-AA60-4E57-A9E5-27EE30923DF8}" destId="{BCCD1092-6C7C-4334-929F-60511043A205}" srcOrd="1" destOrd="0" presId="urn:microsoft.com/office/officeart/2009/3/layout/HorizontalOrganizationChart"/>
+    <dgm:cxn modelId="{064C8775-4BA7-4F24-B233-7714E94FD0DC}" type="presOf" srcId="{00F27E76-D053-4838-B0FC-ECD625A2F185}" destId="{CC8CC60C-3915-44D5-839B-F30D4D658A7D}" srcOrd="1" destOrd="0" presId="urn:microsoft.com/office/officeart/2009/3/layout/HorizontalOrganizationChart"/>
+    <dgm:cxn modelId="{B5D4F456-853B-42FB-B374-C2C809887003}" type="presOf" srcId="{442470E5-8E81-4C87-BE58-2EE5B111A966}" destId="{74BDAF2C-A37D-41F2-BFC4-301D18D193AB}" srcOrd="1" destOrd="0" presId="urn:microsoft.com/office/officeart/2009/3/layout/HorizontalOrganizationChart"/>
+    <dgm:cxn modelId="{60824C18-EA81-4AEE-8623-F0818927F485}" type="presOf" srcId="{7F290ED6-4613-4839-8B5C-6BBBC2E74564}" destId="{E2E01032-55EC-4490-A2E2-EAE58D3C5B9E}" srcOrd="0" destOrd="0" presId="urn:microsoft.com/office/officeart/2009/3/layout/HorizontalOrganizationChart"/>
+    <dgm:cxn modelId="{BC25CA86-F178-45E3-92FE-9F0B1A98C76C}" type="presOf" srcId="{074180C9-AA60-4E57-A9E5-27EE30923DF8}" destId="{E9B8B215-D2F5-4E9F-BE36-683CF88B43B6}" srcOrd="0" destOrd="0" presId="urn:microsoft.com/office/officeart/2009/3/layout/HorizontalOrganizationChart"/>
+    <dgm:cxn modelId="{3C7280B9-4738-4499-928C-764987BB6785}" type="presOf" srcId="{BB9CE1AE-D568-45CE-A149-FD4F224AD884}" destId="{9EFA87BC-94BA-4C59-98FE-454448B4BC0E}" srcOrd="0" destOrd="0" presId="urn:microsoft.com/office/officeart/2009/3/layout/HorizontalOrganizationChart"/>
+    <dgm:cxn modelId="{85A75619-CD0A-43AD-9262-8A5ACA6B8D83}" type="presOf" srcId="{00F27E76-D053-4838-B0FC-ECD625A2F185}" destId="{6E2D032B-DF4D-4C82-A2E6-3483FB5435A1}" srcOrd="0" destOrd="0" presId="urn:microsoft.com/office/officeart/2009/3/layout/HorizontalOrganizationChart"/>
+    <dgm:cxn modelId="{E401B88A-208B-4AB6-AFA1-C4BDD40AAA03}" type="presOf" srcId="{3A52C428-20B3-4453-BFAF-58617BB8395D}" destId="{94F5AD06-8B95-4DCB-B3FF-3FA8EF8C8165}" srcOrd="1" destOrd="0" presId="urn:microsoft.com/office/officeart/2009/3/layout/HorizontalOrganizationChart"/>
+    <dgm:cxn modelId="{872AD911-F1A8-472B-8912-D779DD8A8ED3}" type="presOf" srcId="{3A52C428-20B3-4453-BFAF-58617BB8395D}" destId="{BBE5A1C6-478A-4322-902B-D26E10E2B5D2}" srcOrd="0" destOrd="0" presId="urn:microsoft.com/office/officeart/2009/3/layout/HorizontalOrganizationChart"/>
     <dgm:cxn modelId="{D3E10EFD-62BC-47CD-B6B8-97CBA0558D43}" type="presOf" srcId="{487E4310-5651-4700-A39E-2AEC0EA9F67D}" destId="{B339D220-7BC0-4E8D-89F9-55EDE464832D}" srcOrd="0" destOrd="0" presId="urn:microsoft.com/office/officeart/2009/3/layout/HorizontalOrganizationChart"/>
-    <dgm:cxn modelId="{9A5E58E3-1829-4193-AE75-381B3405552E}" type="presOf" srcId="{120B4DC1-BE43-44CA-BAC8-D47AFD74228A}" destId="{2C6C9DA7-D985-4E9A-B607-56D60461266A}" srcOrd="0" destOrd="0" presId="urn:microsoft.com/office/officeart/2009/3/layout/HorizontalOrganizationChart"/>
     <dgm:cxn modelId="{6DBE9645-C6EC-412C-A1B3-C29E4EF05268}" type="presOf" srcId="{442470E5-8E81-4C87-BE58-2EE5B111A966}" destId="{E4781D85-102B-4EC1-B481-9AE8A70FF4A1}" srcOrd="0" destOrd="0" presId="urn:microsoft.com/office/officeart/2009/3/layout/HorizontalOrganizationChart"/>
-    <dgm:cxn modelId="{C96574FF-FC97-4C58-BFEE-CBB6BB450305}" srcId="{120B4DC1-BE43-44CA-BAC8-D47AFD74228A}" destId="{442470E5-8E81-4C87-BE58-2EE5B111A966}" srcOrd="1" destOrd="0" parTransId="{BB9CE1AE-D568-45CE-A149-FD4F224AD884}" sibTransId="{046D4732-B754-4B4F-BAAC-57C4FCE30E20}"/>
-    <dgm:cxn modelId="{F8B73CB3-B3B5-47B1-A314-3DBDCAF97614}" type="presOf" srcId="{A32FD129-6951-4DA3-AA90-F3C05BC06034}" destId="{64B7FFAB-DB58-4496-BD6D-66B80A109E4B}" srcOrd="1" destOrd="0" presId="urn:microsoft.com/office/officeart/2009/3/layout/HorizontalOrganizationChart"/>
-    <dgm:cxn modelId="{24AE312D-8A46-41B5-B693-7A4D682E63A1}" srcId="{750F83C2-2489-4726-9F9E-35A74BCAC319}" destId="{A32FD129-6951-4DA3-AA90-F3C05BC06034}" srcOrd="0" destOrd="0" parTransId="{16209A0E-84FC-46DC-AE6A-BE9F605141B0}" sibTransId="{A454572B-D4CD-4F98-9279-7773859EB7DF}"/>
-    <dgm:cxn modelId="{60824C18-EA81-4AEE-8623-F0818927F485}" type="presOf" srcId="{7F290ED6-4613-4839-8B5C-6BBBC2E74564}" destId="{E2E01032-55EC-4490-A2E2-EAE58D3C5B9E}" srcOrd="0" destOrd="0" presId="urn:microsoft.com/office/officeart/2009/3/layout/HorizontalOrganizationChart"/>
-    <dgm:cxn modelId="{872AD911-F1A8-472B-8912-D779DD8A8ED3}" type="presOf" srcId="{3A52C428-20B3-4453-BFAF-58617BB8395D}" destId="{BBE5A1C6-478A-4322-902B-D26E10E2B5D2}" srcOrd="0" destOrd="0" presId="urn:microsoft.com/office/officeart/2009/3/layout/HorizontalOrganizationChart"/>
-    <dgm:cxn modelId="{3A745549-F83F-4C1E-8ADB-700683B7ABBF}" type="presOf" srcId="{120B4DC1-BE43-44CA-BAC8-D47AFD74228A}" destId="{8BA48D2F-6A6C-411C-8D81-7633043C1F47}" srcOrd="1" destOrd="0" presId="urn:microsoft.com/office/officeart/2009/3/layout/HorizontalOrganizationChart"/>
-    <dgm:cxn modelId="{1712698E-0FA3-4A45-85C7-909D09CB1621}" srcId="{00F27E76-D053-4838-B0FC-ECD625A2F185}" destId="{074180C9-AA60-4E57-A9E5-27EE30923DF8}" srcOrd="1" destOrd="0" parTransId="{D9DA6E55-9A37-4AE6-AA38-4292EDC51FBE}" sibTransId="{F18C376F-9DFA-471C-AE57-168BA656B570}"/>
-    <dgm:cxn modelId="{180E994A-53B6-464E-838C-A3D8F2DE78C7}" type="presOf" srcId="{5B9CD8AB-CA1C-4C3C-B5D8-A1890CEB0195}" destId="{4B0C367F-7037-4653-AA15-D06435589E37}" srcOrd="0" destOrd="0" presId="urn:microsoft.com/office/officeart/2009/3/layout/HorizontalOrganizationChart"/>
-    <dgm:cxn modelId="{3C7280B9-4738-4499-928C-764987BB6785}" type="presOf" srcId="{BB9CE1AE-D568-45CE-A149-FD4F224AD884}" destId="{9EFA87BC-94BA-4C59-98FE-454448B4BC0E}" srcOrd="0" destOrd="0" presId="urn:microsoft.com/office/officeart/2009/3/layout/HorizontalOrganizationChart"/>
-    <dgm:cxn modelId="{4B3D9C0E-4A50-4C2C-B807-F60C5CDFC7FB}" type="presOf" srcId="{075AE697-E1A9-4658-8586-5D55C7F7D836}" destId="{866D1971-0D1B-4602-AC13-75E3B5D1B981}" srcOrd="0" destOrd="0" presId="urn:microsoft.com/office/officeart/2009/3/layout/HorizontalOrganizationChart"/>
-    <dgm:cxn modelId="{BC25CA86-F178-45E3-92FE-9F0B1A98C76C}" type="presOf" srcId="{074180C9-AA60-4E57-A9E5-27EE30923DF8}" destId="{E9B8B215-D2F5-4E9F-BE36-683CF88B43B6}" srcOrd="0" destOrd="0" presId="urn:microsoft.com/office/officeart/2009/3/layout/HorizontalOrganizationChart"/>
-    <dgm:cxn modelId="{B9F44E6C-971B-42DE-BDAF-6C951BBB42A5}" type="presOf" srcId="{D9DA6E55-9A37-4AE6-AA38-4292EDC51FBE}" destId="{69541900-6A79-4139-8AA7-BCAF9BC48D16}" srcOrd="0" destOrd="0" presId="urn:microsoft.com/office/officeart/2009/3/layout/HorizontalOrganizationChart"/>
-    <dgm:cxn modelId="{064C8775-4BA7-4F24-B233-7714E94FD0DC}" type="presOf" srcId="{00F27E76-D053-4838-B0FC-ECD625A2F185}" destId="{CC8CC60C-3915-44D5-839B-F30D4D658A7D}" srcOrd="1" destOrd="0" presId="urn:microsoft.com/office/officeart/2009/3/layout/HorizontalOrganizationChart"/>
-    <dgm:cxn modelId="{98ED4D4E-A5C6-43DD-A367-647B5A6958A7}" srcId="{120B4DC1-BE43-44CA-BAC8-D47AFD74228A}" destId="{3A52C428-20B3-4453-BFAF-58617BB8395D}" srcOrd="0" destOrd="0" parTransId="{08AE8121-44A9-49E7-BB6A-8CDCF1FE8595}" sibTransId="{C598FDE5-7F6A-4E58-B919-2135218176CC}"/>
-    <dgm:cxn modelId="{D6520D39-3530-469E-AD59-70CDE683966F}" srcId="{074180C9-AA60-4E57-A9E5-27EE30923DF8}" destId="{5B9CD8AB-CA1C-4C3C-B5D8-A1890CEB0195}" srcOrd="0" destOrd="0" parTransId="{075AE697-E1A9-4658-8586-5D55C7F7D836}" sibTransId="{2B0D433A-76F3-4840-AF85-E0766D3DB483}"/>
-    <dgm:cxn modelId="{01EF61B2-E395-4461-A90A-73B360DABC97}" type="presOf" srcId="{074180C9-AA60-4E57-A9E5-27EE30923DF8}" destId="{BCCD1092-6C7C-4334-929F-60511043A205}" srcOrd="1" destOrd="0" presId="urn:microsoft.com/office/officeart/2009/3/layout/HorizontalOrganizationChart"/>
-    <dgm:cxn modelId="{C38329A7-A1A2-4DCF-B825-6A994C25B4D0}" srcId="{A32FD129-6951-4DA3-AA90-F3C05BC06034}" destId="{00F27E76-D053-4838-B0FC-ECD625A2F185}" srcOrd="0" destOrd="0" parTransId="{487E4310-5651-4700-A39E-2AEC0EA9F67D}" sibTransId="{9F343612-9E05-4E74-9BB0-0F127CCEA8D2}"/>
-    <dgm:cxn modelId="{24245CF5-B0FA-40FE-BB72-F2924EE618DC}" type="presOf" srcId="{5B9CD8AB-CA1C-4C3C-B5D8-A1890CEB0195}" destId="{A6C869B9-5992-48C0-80E2-751984EC983A}" srcOrd="1" destOrd="0" presId="urn:microsoft.com/office/officeart/2009/3/layout/HorizontalOrganizationChart"/>
-    <dgm:cxn modelId="{B5D4F456-853B-42FB-B374-C2C809887003}" type="presOf" srcId="{442470E5-8E81-4C87-BE58-2EE5B111A966}" destId="{74BDAF2C-A37D-41F2-BFC4-301D18D193AB}" srcOrd="1" destOrd="0" presId="urn:microsoft.com/office/officeart/2009/3/layout/HorizontalOrganizationChart"/>
-    <dgm:cxn modelId="{85A75619-CD0A-43AD-9262-8A5ACA6B8D83}" type="presOf" srcId="{00F27E76-D053-4838-B0FC-ECD625A2F185}" destId="{6E2D032B-DF4D-4C82-A2E6-3483FB5435A1}" srcOrd="0" destOrd="0" presId="urn:microsoft.com/office/officeart/2009/3/layout/HorizontalOrganizationChart"/>
-    <dgm:cxn modelId="{E676DA69-5D24-4E9F-A733-E98B100DF40E}" srcId="{00F27E76-D053-4838-B0FC-ECD625A2F185}" destId="{120B4DC1-BE43-44CA-BAC8-D47AFD74228A}" srcOrd="0" destOrd="0" parTransId="{7F290ED6-4613-4839-8B5C-6BBBC2E74564}" sibTransId="{E30ADA23-9AE4-4A79-92C7-7CFE72E8B3D0}"/>
-    <dgm:cxn modelId="{36799FF1-4F07-4E50-BFC0-4FC79FB269CF}" type="presOf" srcId="{A32FD129-6951-4DA3-AA90-F3C05BC06034}" destId="{56E76F2F-7431-42E1-ACCC-02B79A77D018}" srcOrd="0" destOrd="0" presId="urn:microsoft.com/office/officeart/2009/3/layout/HorizontalOrganizationChart"/>
-    <dgm:cxn modelId="{C8F10E01-8A0F-4C8C-BD75-BB7C33D93F42}" type="presOf" srcId="{08AE8121-44A9-49E7-BB6A-8CDCF1FE8595}" destId="{3D7F2BD7-EEFA-4A09-BAAA-A5467747A5B4}" srcOrd="0" destOrd="0" presId="urn:microsoft.com/office/officeart/2009/3/layout/HorizontalOrganizationChart"/>
-    <dgm:cxn modelId="{E401B88A-208B-4AB6-AFA1-C4BDD40AAA03}" type="presOf" srcId="{3A52C428-20B3-4453-BFAF-58617BB8395D}" destId="{94F5AD06-8B95-4DCB-B3FF-3FA8EF8C8165}" srcOrd="1" destOrd="0" presId="urn:microsoft.com/office/officeart/2009/3/layout/HorizontalOrganizationChart"/>
     <dgm:cxn modelId="{C4427432-E7BB-4988-9828-83048954E8EA}" type="presParOf" srcId="{7A3CB1A1-112F-4DDF-BD1C-3E83DBE185B0}" destId="{807D473F-1CF3-47D8-B9DA-0CDCBE173537}" srcOrd="0" destOrd="0" presId="urn:microsoft.com/office/officeart/2009/3/layout/HorizontalOrganizationChart"/>
     <dgm:cxn modelId="{DFD79605-5A98-413B-B63F-F78AAF2623BF}" type="presParOf" srcId="{807D473F-1CF3-47D8-B9DA-0CDCBE173537}" destId="{26A40E7C-324B-4B04-A8F9-4B84778D99F8}" srcOrd="0" destOrd="0" presId="urn:microsoft.com/office/officeart/2009/3/layout/HorizontalOrganizationChart"/>
     <dgm:cxn modelId="{8262446C-BC05-4450-85FB-9D5BDF03EBA7}" type="presParOf" srcId="{26A40E7C-324B-4B04-A8F9-4B84778D99F8}" destId="{56E76F2F-7431-42E1-ACCC-02B79A77D018}" srcOrd="0" destOrd="0" presId="urn:microsoft.com/office/officeart/2009/3/layout/HorizontalOrganizationChart"/>
@@ -3387,6 +3527,13 @@
         </dgm:presLayoutVars>
       </dgm:prSet>
       <dgm:spPr/>
+      <dgm:t>
+        <a:bodyPr/>
+        <a:lstStyle/>
+        <a:p>
+          <a:endParaRPr lang="pt-BR"/>
+        </a:p>
+      </dgm:t>
     </dgm:pt>
     <dgm:pt modelId="{3B16B6A1-0DAE-46FF-8BBD-EDBC7A332D6C}" type="pres">
       <dgm:prSet presAssocID="{8D5FDD50-92B6-484D-9F33-ECBEC3DBA967}" presName="hierFlow" presStyleCnt="0"/>
@@ -3413,6 +3560,13 @@
         </dgm:presLayoutVars>
       </dgm:prSet>
       <dgm:spPr/>
+      <dgm:t>
+        <a:bodyPr/>
+        <a:lstStyle/>
+        <a:p>
+          <a:endParaRPr lang="pt-BR"/>
+        </a:p>
+      </dgm:t>
     </dgm:pt>
     <dgm:pt modelId="{2772B80C-9E71-4B49-AC7F-0A01A4A35F20}" type="pres">
       <dgm:prSet presAssocID="{32F57AC1-33E6-4385-87AA-54CA417DA641}" presName="hierChild2" presStyleCnt="0"/>
@@ -3421,6 +3575,13 @@
     <dgm:pt modelId="{ED59F7BD-492C-44FF-BA19-C9825A4FB025}" type="pres">
       <dgm:prSet presAssocID="{5FF24799-9D94-4C82-BD4D-140D4015CB2B}" presName="Name19" presStyleLbl="parChTrans1D2" presStyleIdx="0" presStyleCnt="2"/>
       <dgm:spPr/>
+      <dgm:t>
+        <a:bodyPr/>
+        <a:lstStyle/>
+        <a:p>
+          <a:endParaRPr lang="pt-BR"/>
+        </a:p>
+      </dgm:t>
     </dgm:pt>
     <dgm:pt modelId="{2ABC4822-9468-4C8D-8293-D830F99CDDCF}" type="pres">
       <dgm:prSet presAssocID="{AFD31390-6AC1-4FA3-BAED-940C68F6DC88}" presName="Name21" presStyleCnt="0"/>
@@ -3429,6 +3590,13 @@
     <dgm:pt modelId="{DE5A9EAF-482B-4BF2-AF77-13EAE24C70B0}" type="pres">
       <dgm:prSet presAssocID="{AFD31390-6AC1-4FA3-BAED-940C68F6DC88}" presName="level2Shape" presStyleLbl="node2" presStyleIdx="0" presStyleCnt="2" custLinFactNeighborX="-23282"/>
       <dgm:spPr/>
+      <dgm:t>
+        <a:bodyPr/>
+        <a:lstStyle/>
+        <a:p>
+          <a:endParaRPr lang="pt-BR"/>
+        </a:p>
+      </dgm:t>
     </dgm:pt>
     <dgm:pt modelId="{E6D3E2E4-D9C8-4DBD-8AA1-1A3DCAEDCEC1}" type="pres">
       <dgm:prSet presAssocID="{AFD31390-6AC1-4FA3-BAED-940C68F6DC88}" presName="hierChild3" presStyleCnt="0"/>
@@ -3437,6 +3605,13 @@
     <dgm:pt modelId="{6B9BE3B4-6371-45FE-A71C-6E55CC800E74}" type="pres">
       <dgm:prSet presAssocID="{CB4D62B7-20A0-42CA-B7A0-532513CCE3B9}" presName="Name19" presStyleLbl="parChTrans1D3" presStyleIdx="0" presStyleCnt="2"/>
       <dgm:spPr/>
+      <dgm:t>
+        <a:bodyPr/>
+        <a:lstStyle/>
+        <a:p>
+          <a:endParaRPr lang="pt-BR"/>
+        </a:p>
+      </dgm:t>
     </dgm:pt>
     <dgm:pt modelId="{DCBD9F83-8215-4B66-8225-0278EEE19396}" type="pres">
       <dgm:prSet presAssocID="{ED7F2F8B-596F-4ACC-88C7-425BD0C69125}" presName="Name21" presStyleCnt="0"/>
@@ -3445,6 +3620,13 @@
     <dgm:pt modelId="{382C07DB-DF31-4C35-A8A6-001339A6AF65}" type="pres">
       <dgm:prSet presAssocID="{ED7F2F8B-596F-4ACC-88C7-425BD0C69125}" presName="level2Shape" presStyleLbl="node3" presStyleIdx="0" presStyleCnt="2" custLinFactNeighborX="-23282"/>
       <dgm:spPr/>
+      <dgm:t>
+        <a:bodyPr/>
+        <a:lstStyle/>
+        <a:p>
+          <a:endParaRPr lang="pt-BR"/>
+        </a:p>
+      </dgm:t>
     </dgm:pt>
     <dgm:pt modelId="{4E45FD3D-81E0-403A-A92D-56086A2E4919}" type="pres">
       <dgm:prSet presAssocID="{ED7F2F8B-596F-4ACC-88C7-425BD0C69125}" presName="hierChild3" presStyleCnt="0"/>
@@ -3453,6 +3635,13 @@
     <dgm:pt modelId="{F1E4FA91-E817-4642-B67C-69461E749193}" type="pres">
       <dgm:prSet presAssocID="{27D2D03C-6B7C-48CB-A639-65E257CC0E96}" presName="Name19" presStyleLbl="parChTrans1D2" presStyleIdx="1" presStyleCnt="2"/>
       <dgm:spPr/>
+      <dgm:t>
+        <a:bodyPr/>
+        <a:lstStyle/>
+        <a:p>
+          <a:endParaRPr lang="pt-BR"/>
+        </a:p>
+      </dgm:t>
     </dgm:pt>
     <dgm:pt modelId="{D01F688C-1BDB-4060-8359-D2CF40A1BBF6}" type="pres">
       <dgm:prSet presAssocID="{F9BF59C0-DF44-4744-B321-308C735D2948}" presName="Name21" presStyleCnt="0"/>
@@ -3461,6 +3650,13 @@
     <dgm:pt modelId="{8282B123-79D2-4E0A-BF9E-E258F9155E15}" type="pres">
       <dgm:prSet presAssocID="{F9BF59C0-DF44-4744-B321-308C735D2948}" presName="level2Shape" presStyleLbl="node2" presStyleIdx="1" presStyleCnt="2" custLinFactNeighborX="20814"/>
       <dgm:spPr/>
+      <dgm:t>
+        <a:bodyPr/>
+        <a:lstStyle/>
+        <a:p>
+          <a:endParaRPr lang="pt-BR"/>
+        </a:p>
+      </dgm:t>
     </dgm:pt>
     <dgm:pt modelId="{84B0F10B-70F7-485B-8E3F-1A5CF29D5F01}" type="pres">
       <dgm:prSet presAssocID="{F9BF59C0-DF44-4744-B321-308C735D2948}" presName="hierChild3" presStyleCnt="0"/>
@@ -3469,6 +3665,13 @@
     <dgm:pt modelId="{CEA2203F-6CE8-44B9-9465-03032392CF78}" type="pres">
       <dgm:prSet presAssocID="{796B1FE4-BA91-4115-9C79-7C9D8BC050E3}" presName="Name19" presStyleLbl="parChTrans1D3" presStyleIdx="1" presStyleCnt="2"/>
       <dgm:spPr/>
+      <dgm:t>
+        <a:bodyPr/>
+        <a:lstStyle/>
+        <a:p>
+          <a:endParaRPr lang="pt-BR"/>
+        </a:p>
+      </dgm:t>
     </dgm:pt>
     <dgm:pt modelId="{DD5E025F-70F4-48FC-B18F-38C89107B013}" type="pres">
       <dgm:prSet presAssocID="{5AC319E5-1379-4860-865D-82CA5F8F6D74}" presName="Name21" presStyleCnt="0"/>
@@ -3496,20 +3699,20 @@
   </dgm:ptLst>
   <dgm:cxnLst>
     <dgm:cxn modelId="{EF3B13AC-1346-465D-B414-E6D98B892BF2}" type="presOf" srcId="{8D5FDD50-92B6-484D-9F33-ECBEC3DBA967}" destId="{28B760FA-B381-41EC-8B4D-492CAB381BC4}" srcOrd="0" destOrd="0" presId="urn:microsoft.com/office/officeart/2005/8/layout/hierarchy6"/>
+    <dgm:cxn modelId="{C30C902C-6A2F-4DA3-AF99-D9CB01CDB348}" type="presOf" srcId="{F9BF59C0-DF44-4744-B321-308C735D2948}" destId="{8282B123-79D2-4E0A-BF9E-E258F9155E15}" srcOrd="0" destOrd="0" presId="urn:microsoft.com/office/officeart/2005/8/layout/hierarchy6"/>
+    <dgm:cxn modelId="{4FF67F27-B86C-4749-B0D5-94A3B5C9900D}" type="presOf" srcId="{796B1FE4-BA91-4115-9C79-7C9D8BC050E3}" destId="{CEA2203F-6CE8-44B9-9465-03032392CF78}" srcOrd="0" destOrd="0" presId="urn:microsoft.com/office/officeart/2005/8/layout/hierarchy6"/>
+    <dgm:cxn modelId="{1029F727-8551-4955-8148-82413600BBF7}" type="presOf" srcId="{5AC319E5-1379-4860-865D-82CA5F8F6D74}" destId="{6C9A0E75-2E9F-4357-954E-2D66B9CAC58C}" srcOrd="0" destOrd="0" presId="urn:microsoft.com/office/officeart/2005/8/layout/hierarchy6"/>
+    <dgm:cxn modelId="{15D79CEA-3B19-49F5-9673-FC5172FA3007}" type="presOf" srcId="{CB4D62B7-20A0-42CA-B7A0-532513CCE3B9}" destId="{6B9BE3B4-6371-45FE-A71C-6E55CC800E74}" srcOrd="0" destOrd="0" presId="urn:microsoft.com/office/officeart/2005/8/layout/hierarchy6"/>
+    <dgm:cxn modelId="{1A582BAB-843E-432E-9731-21810453664C}" type="presOf" srcId="{5FF24799-9D94-4C82-BD4D-140D4015CB2B}" destId="{ED59F7BD-492C-44FF-BA19-C9825A4FB025}" srcOrd="0" destOrd="0" presId="urn:microsoft.com/office/officeart/2005/8/layout/hierarchy6"/>
+    <dgm:cxn modelId="{2C02A123-C83F-409F-9DB4-0D40E511A748}" type="presOf" srcId="{ED7F2F8B-596F-4ACC-88C7-425BD0C69125}" destId="{382C07DB-DF31-4C35-A8A6-001339A6AF65}" srcOrd="0" destOrd="0" presId="urn:microsoft.com/office/officeart/2005/8/layout/hierarchy6"/>
     <dgm:cxn modelId="{5759436E-0925-4D61-A8DD-C88825E506BA}" srcId="{8D5FDD50-92B6-484D-9F33-ECBEC3DBA967}" destId="{32F57AC1-33E6-4385-87AA-54CA417DA641}" srcOrd="0" destOrd="0" parTransId="{4CF32539-B159-4D5B-8813-0F2517A92619}" sibTransId="{1D3139AF-ED12-4B35-986A-3B8D78646C94}"/>
+    <dgm:cxn modelId="{FA1D91B1-FA40-437C-8AE8-D252B716A960}" type="presOf" srcId="{27D2D03C-6B7C-48CB-A639-65E257CC0E96}" destId="{F1E4FA91-E817-4642-B67C-69461E749193}" srcOrd="0" destOrd="0" presId="urn:microsoft.com/office/officeart/2005/8/layout/hierarchy6"/>
+    <dgm:cxn modelId="{4DB2AC0F-39E4-401D-8E5C-59CAB2B05FD6}" srcId="{32F57AC1-33E6-4385-87AA-54CA417DA641}" destId="{AFD31390-6AC1-4FA3-BAED-940C68F6DC88}" srcOrd="0" destOrd="0" parTransId="{5FF24799-9D94-4C82-BD4D-140D4015CB2B}" sibTransId="{419E9FC1-BC4A-4460-8112-FCFA3CD98EFD}"/>
+    <dgm:cxn modelId="{B001E01C-AF69-4B79-A4F1-94C26395D088}" srcId="{AFD31390-6AC1-4FA3-BAED-940C68F6DC88}" destId="{ED7F2F8B-596F-4ACC-88C7-425BD0C69125}" srcOrd="0" destOrd="0" parTransId="{CB4D62B7-20A0-42CA-B7A0-532513CCE3B9}" sibTransId="{57829ED3-75E3-4323-A3BE-308A2C52FF80}"/>
     <dgm:cxn modelId="{76DFF4E7-54D6-47B4-82E8-67D09AD80408}" type="presOf" srcId="{AFD31390-6AC1-4FA3-BAED-940C68F6DC88}" destId="{DE5A9EAF-482B-4BF2-AF77-13EAE24C70B0}" srcOrd="0" destOrd="0" presId="urn:microsoft.com/office/officeart/2005/8/layout/hierarchy6"/>
-    <dgm:cxn modelId="{2C02A123-C83F-409F-9DB4-0D40E511A748}" type="presOf" srcId="{ED7F2F8B-596F-4ACC-88C7-425BD0C69125}" destId="{382C07DB-DF31-4C35-A8A6-001339A6AF65}" srcOrd="0" destOrd="0" presId="urn:microsoft.com/office/officeart/2005/8/layout/hierarchy6"/>
-    <dgm:cxn modelId="{15D79CEA-3B19-49F5-9673-FC5172FA3007}" type="presOf" srcId="{CB4D62B7-20A0-42CA-B7A0-532513CCE3B9}" destId="{6B9BE3B4-6371-45FE-A71C-6E55CC800E74}" srcOrd="0" destOrd="0" presId="urn:microsoft.com/office/officeart/2005/8/layout/hierarchy6"/>
     <dgm:cxn modelId="{C0AF3F0A-9190-4AC9-A007-3DBF276853A0}" type="presOf" srcId="{32F57AC1-33E6-4385-87AA-54CA417DA641}" destId="{6C530A79-90C4-49C8-A5F2-23392F853946}" srcOrd="0" destOrd="0" presId="urn:microsoft.com/office/officeart/2005/8/layout/hierarchy6"/>
+    <dgm:cxn modelId="{2C2A58B9-C1C1-4E99-8F9F-57F5352C17B3}" srcId="{32F57AC1-33E6-4385-87AA-54CA417DA641}" destId="{F9BF59C0-DF44-4744-B321-308C735D2948}" srcOrd="1" destOrd="0" parTransId="{27D2D03C-6B7C-48CB-A639-65E257CC0E96}" sibTransId="{621FCEB5-3DC7-49FE-9793-8D4BC0648D86}"/>
     <dgm:cxn modelId="{5C5643DF-501E-4C4D-AD3C-AE8B6623289F}" srcId="{F9BF59C0-DF44-4744-B321-308C735D2948}" destId="{5AC319E5-1379-4860-865D-82CA5F8F6D74}" srcOrd="0" destOrd="0" parTransId="{796B1FE4-BA91-4115-9C79-7C9D8BC050E3}" sibTransId="{80556F87-8DB5-487B-B9F7-E91301DA1B52}"/>
-    <dgm:cxn modelId="{B001E01C-AF69-4B79-A4F1-94C26395D088}" srcId="{AFD31390-6AC1-4FA3-BAED-940C68F6DC88}" destId="{ED7F2F8B-596F-4ACC-88C7-425BD0C69125}" srcOrd="0" destOrd="0" parTransId="{CB4D62B7-20A0-42CA-B7A0-532513CCE3B9}" sibTransId="{57829ED3-75E3-4323-A3BE-308A2C52FF80}"/>
-    <dgm:cxn modelId="{1A582BAB-843E-432E-9731-21810453664C}" type="presOf" srcId="{5FF24799-9D94-4C82-BD4D-140D4015CB2B}" destId="{ED59F7BD-492C-44FF-BA19-C9825A4FB025}" srcOrd="0" destOrd="0" presId="urn:microsoft.com/office/officeart/2005/8/layout/hierarchy6"/>
-    <dgm:cxn modelId="{1029F727-8551-4955-8148-82413600BBF7}" type="presOf" srcId="{5AC319E5-1379-4860-865D-82CA5F8F6D74}" destId="{6C9A0E75-2E9F-4357-954E-2D66B9CAC58C}" srcOrd="0" destOrd="0" presId="urn:microsoft.com/office/officeart/2005/8/layout/hierarchy6"/>
-    <dgm:cxn modelId="{4DB2AC0F-39E4-401D-8E5C-59CAB2B05FD6}" srcId="{32F57AC1-33E6-4385-87AA-54CA417DA641}" destId="{AFD31390-6AC1-4FA3-BAED-940C68F6DC88}" srcOrd="0" destOrd="0" parTransId="{5FF24799-9D94-4C82-BD4D-140D4015CB2B}" sibTransId="{419E9FC1-BC4A-4460-8112-FCFA3CD98EFD}"/>
-    <dgm:cxn modelId="{C30C902C-6A2F-4DA3-AF99-D9CB01CDB348}" type="presOf" srcId="{F9BF59C0-DF44-4744-B321-308C735D2948}" destId="{8282B123-79D2-4E0A-BF9E-E258F9155E15}" srcOrd="0" destOrd="0" presId="urn:microsoft.com/office/officeart/2005/8/layout/hierarchy6"/>
-    <dgm:cxn modelId="{2C2A58B9-C1C1-4E99-8F9F-57F5352C17B3}" srcId="{32F57AC1-33E6-4385-87AA-54CA417DA641}" destId="{F9BF59C0-DF44-4744-B321-308C735D2948}" srcOrd="1" destOrd="0" parTransId="{27D2D03C-6B7C-48CB-A639-65E257CC0E96}" sibTransId="{621FCEB5-3DC7-49FE-9793-8D4BC0648D86}"/>
-    <dgm:cxn modelId="{4FF67F27-B86C-4749-B0D5-94A3B5C9900D}" type="presOf" srcId="{796B1FE4-BA91-4115-9C79-7C9D8BC050E3}" destId="{CEA2203F-6CE8-44B9-9465-03032392CF78}" srcOrd="0" destOrd="0" presId="urn:microsoft.com/office/officeart/2005/8/layout/hierarchy6"/>
-    <dgm:cxn modelId="{FA1D91B1-FA40-437C-8AE8-D252B716A960}" type="presOf" srcId="{27D2D03C-6B7C-48CB-A639-65E257CC0E96}" destId="{F1E4FA91-E817-4642-B67C-69461E749193}" srcOrd="0" destOrd="0" presId="urn:microsoft.com/office/officeart/2005/8/layout/hierarchy6"/>
     <dgm:cxn modelId="{93441FFF-E60D-456B-984C-A8A341F599E0}" type="presParOf" srcId="{28B760FA-B381-41EC-8B4D-492CAB381BC4}" destId="{3B16B6A1-0DAE-46FF-8BBD-EDBC7A332D6C}" srcOrd="0" destOrd="0" presId="urn:microsoft.com/office/officeart/2005/8/layout/hierarchy6"/>
     <dgm:cxn modelId="{6661E091-8334-482A-91A2-BE959B3E38B5}" type="presParOf" srcId="{3B16B6A1-0DAE-46FF-8BBD-EDBC7A332D6C}" destId="{010D124E-7220-40C4-B1FE-D515AE2A5227}" srcOrd="0" destOrd="0" presId="urn:microsoft.com/office/officeart/2005/8/layout/hierarchy6"/>
     <dgm:cxn modelId="{F0A82F36-C702-4476-834C-FBA3B30DA156}" type="presParOf" srcId="{010D124E-7220-40C4-B1FE-D515AE2A5227}" destId="{D546113F-0EE7-47CB-AF4A-7B882A2C2C6B}" srcOrd="0" destOrd="0" presId="urn:microsoft.com/office/officeart/2005/8/layout/hierarchy6"/>
@@ -3774,6 +3977,13 @@
         </dgm:presLayoutVars>
       </dgm:prSet>
       <dgm:spPr/>
+      <dgm:t>
+        <a:bodyPr/>
+        <a:lstStyle/>
+        <a:p>
+          <a:endParaRPr lang="pt-BR"/>
+        </a:p>
+      </dgm:t>
     </dgm:pt>
     <dgm:pt modelId="{3B16B6A1-0DAE-46FF-8BBD-EDBC7A332D6C}" type="pres">
       <dgm:prSet presAssocID="{8D5FDD50-92B6-484D-9F33-ECBEC3DBA967}" presName="hierFlow" presStyleCnt="0"/>
@@ -3800,6 +4010,13 @@
         </dgm:presLayoutVars>
       </dgm:prSet>
       <dgm:spPr/>
+      <dgm:t>
+        <a:bodyPr/>
+        <a:lstStyle/>
+        <a:p>
+          <a:endParaRPr lang="pt-BR"/>
+        </a:p>
+      </dgm:t>
     </dgm:pt>
     <dgm:pt modelId="{2772B80C-9E71-4B49-AC7F-0A01A4A35F20}" type="pres">
       <dgm:prSet presAssocID="{32F57AC1-33E6-4385-87AA-54CA417DA641}" presName="hierChild2" presStyleCnt="0"/>
@@ -3808,6 +4025,13 @@
     <dgm:pt modelId="{ED59F7BD-492C-44FF-BA19-C9825A4FB025}" type="pres">
       <dgm:prSet presAssocID="{5FF24799-9D94-4C82-BD4D-140D4015CB2B}" presName="Name19" presStyleLbl="parChTrans1D2" presStyleIdx="0" presStyleCnt="2"/>
       <dgm:spPr/>
+      <dgm:t>
+        <a:bodyPr/>
+        <a:lstStyle/>
+        <a:p>
+          <a:endParaRPr lang="pt-BR"/>
+        </a:p>
+      </dgm:t>
     </dgm:pt>
     <dgm:pt modelId="{2ABC4822-9468-4C8D-8293-D830F99CDDCF}" type="pres">
       <dgm:prSet presAssocID="{AFD31390-6AC1-4FA3-BAED-940C68F6DC88}" presName="Name21" presStyleCnt="0"/>
@@ -3816,6 +4040,13 @@
     <dgm:pt modelId="{DE5A9EAF-482B-4BF2-AF77-13EAE24C70B0}" type="pres">
       <dgm:prSet presAssocID="{AFD31390-6AC1-4FA3-BAED-940C68F6DC88}" presName="level2Shape" presStyleLbl="node2" presStyleIdx="0" presStyleCnt="2" custLinFactNeighborX="-23282"/>
       <dgm:spPr/>
+      <dgm:t>
+        <a:bodyPr/>
+        <a:lstStyle/>
+        <a:p>
+          <a:endParaRPr lang="pt-BR"/>
+        </a:p>
+      </dgm:t>
     </dgm:pt>
     <dgm:pt modelId="{E6D3E2E4-D9C8-4DBD-8AA1-1A3DCAEDCEC1}" type="pres">
       <dgm:prSet presAssocID="{AFD31390-6AC1-4FA3-BAED-940C68F6DC88}" presName="hierChild3" presStyleCnt="0"/>
@@ -3824,6 +4055,13 @@
     <dgm:pt modelId="{6B9BE3B4-6371-45FE-A71C-6E55CC800E74}" type="pres">
       <dgm:prSet presAssocID="{CB4D62B7-20A0-42CA-B7A0-532513CCE3B9}" presName="Name19" presStyleLbl="parChTrans1D3" presStyleIdx="0" presStyleCnt="2"/>
       <dgm:spPr/>
+      <dgm:t>
+        <a:bodyPr/>
+        <a:lstStyle/>
+        <a:p>
+          <a:endParaRPr lang="pt-BR"/>
+        </a:p>
+      </dgm:t>
     </dgm:pt>
     <dgm:pt modelId="{DCBD9F83-8215-4B66-8225-0278EEE19396}" type="pres">
       <dgm:prSet presAssocID="{ED7F2F8B-596F-4ACC-88C7-425BD0C69125}" presName="Name21" presStyleCnt="0"/>
@@ -3832,6 +4070,13 @@
     <dgm:pt modelId="{382C07DB-DF31-4C35-A8A6-001339A6AF65}" type="pres">
       <dgm:prSet presAssocID="{ED7F2F8B-596F-4ACC-88C7-425BD0C69125}" presName="level2Shape" presStyleLbl="node3" presStyleIdx="0" presStyleCnt="2" custLinFactNeighborX="-23282"/>
       <dgm:spPr/>
+      <dgm:t>
+        <a:bodyPr/>
+        <a:lstStyle/>
+        <a:p>
+          <a:endParaRPr lang="pt-BR"/>
+        </a:p>
+      </dgm:t>
     </dgm:pt>
     <dgm:pt modelId="{4E45FD3D-81E0-403A-A92D-56086A2E4919}" type="pres">
       <dgm:prSet presAssocID="{ED7F2F8B-596F-4ACC-88C7-425BD0C69125}" presName="hierChild3" presStyleCnt="0"/>
@@ -3840,6 +4085,13 @@
     <dgm:pt modelId="{F1E4FA91-E817-4642-B67C-69461E749193}" type="pres">
       <dgm:prSet presAssocID="{27D2D03C-6B7C-48CB-A639-65E257CC0E96}" presName="Name19" presStyleLbl="parChTrans1D2" presStyleIdx="1" presStyleCnt="2"/>
       <dgm:spPr/>
+      <dgm:t>
+        <a:bodyPr/>
+        <a:lstStyle/>
+        <a:p>
+          <a:endParaRPr lang="pt-BR"/>
+        </a:p>
+      </dgm:t>
     </dgm:pt>
     <dgm:pt modelId="{D01F688C-1BDB-4060-8359-D2CF40A1BBF6}" type="pres">
       <dgm:prSet presAssocID="{F9BF59C0-DF44-4744-B321-308C735D2948}" presName="Name21" presStyleCnt="0"/>
@@ -3848,6 +4100,13 @@
     <dgm:pt modelId="{8282B123-79D2-4E0A-BF9E-E258F9155E15}" type="pres">
       <dgm:prSet presAssocID="{F9BF59C0-DF44-4744-B321-308C735D2948}" presName="level2Shape" presStyleLbl="node2" presStyleIdx="1" presStyleCnt="2" custLinFactNeighborX="20814"/>
       <dgm:spPr/>
+      <dgm:t>
+        <a:bodyPr/>
+        <a:lstStyle/>
+        <a:p>
+          <a:endParaRPr lang="pt-BR"/>
+        </a:p>
+      </dgm:t>
     </dgm:pt>
     <dgm:pt modelId="{84B0F10B-70F7-485B-8E3F-1A5CF29D5F01}" type="pres">
       <dgm:prSet presAssocID="{F9BF59C0-DF44-4744-B321-308C735D2948}" presName="hierChild3" presStyleCnt="0"/>
@@ -3856,6 +4115,13 @@
     <dgm:pt modelId="{CEA2203F-6CE8-44B9-9465-03032392CF78}" type="pres">
       <dgm:prSet presAssocID="{796B1FE4-BA91-4115-9C79-7C9D8BC050E3}" presName="Name19" presStyleLbl="parChTrans1D3" presStyleIdx="1" presStyleCnt="2"/>
       <dgm:spPr/>
+      <dgm:t>
+        <a:bodyPr/>
+        <a:lstStyle/>
+        <a:p>
+          <a:endParaRPr lang="pt-BR"/>
+        </a:p>
+      </dgm:t>
     </dgm:pt>
     <dgm:pt modelId="{DD5E025F-70F4-48FC-B18F-38C89107B013}" type="pres">
       <dgm:prSet presAssocID="{5AC319E5-1379-4860-865D-82CA5F8F6D74}" presName="Name21" presStyleCnt="0"/>
@@ -3882,21 +4148,21 @@
     </dgm:pt>
   </dgm:ptLst>
   <dgm:cxnLst>
+    <dgm:cxn modelId="{A921FEE1-3680-4325-A960-B1C084F9E9E9}" type="presOf" srcId="{8D5FDD50-92B6-484D-9F33-ECBEC3DBA967}" destId="{28B760FA-B381-41EC-8B4D-492CAB381BC4}" srcOrd="0" destOrd="0" presId="urn:microsoft.com/office/officeart/2005/8/layout/hierarchy6"/>
+    <dgm:cxn modelId="{4DB2AC0F-39E4-401D-8E5C-59CAB2B05FD6}" srcId="{32F57AC1-33E6-4385-87AA-54CA417DA641}" destId="{AFD31390-6AC1-4FA3-BAED-940C68F6DC88}" srcOrd="0" destOrd="0" parTransId="{5FF24799-9D94-4C82-BD4D-140D4015CB2B}" sibTransId="{419E9FC1-BC4A-4460-8112-FCFA3CD98EFD}"/>
+    <dgm:cxn modelId="{5759436E-0925-4D61-A8DD-C88825E506BA}" srcId="{8D5FDD50-92B6-484D-9F33-ECBEC3DBA967}" destId="{32F57AC1-33E6-4385-87AA-54CA417DA641}" srcOrd="0" destOrd="0" parTransId="{4CF32539-B159-4D5B-8813-0F2517A92619}" sibTransId="{1D3139AF-ED12-4B35-986A-3B8D78646C94}"/>
+    <dgm:cxn modelId="{B7FE826E-C8F9-4876-9637-074B49B81DF4}" type="presOf" srcId="{5AC319E5-1379-4860-865D-82CA5F8F6D74}" destId="{6C9A0E75-2E9F-4357-954E-2D66B9CAC58C}" srcOrd="0" destOrd="0" presId="urn:microsoft.com/office/officeart/2005/8/layout/hierarchy6"/>
+    <dgm:cxn modelId="{C32FD768-55FE-4BD7-8170-F539FBEB6EEE}" type="presOf" srcId="{ED7F2F8B-596F-4ACC-88C7-425BD0C69125}" destId="{382C07DB-DF31-4C35-A8A6-001339A6AF65}" srcOrd="0" destOrd="0" presId="urn:microsoft.com/office/officeart/2005/8/layout/hierarchy6"/>
+    <dgm:cxn modelId="{CF03D959-2934-4325-9B63-D757920D2C0E}" type="presOf" srcId="{27D2D03C-6B7C-48CB-A639-65E257CC0E96}" destId="{F1E4FA91-E817-4642-B67C-69461E749193}" srcOrd="0" destOrd="0" presId="urn:microsoft.com/office/officeart/2005/8/layout/hierarchy6"/>
+    <dgm:cxn modelId="{B001E01C-AF69-4B79-A4F1-94C26395D088}" srcId="{AFD31390-6AC1-4FA3-BAED-940C68F6DC88}" destId="{ED7F2F8B-596F-4ACC-88C7-425BD0C69125}" srcOrd="0" destOrd="0" parTransId="{CB4D62B7-20A0-42CA-B7A0-532513CCE3B9}" sibTransId="{57829ED3-75E3-4323-A3BE-308A2C52FF80}"/>
+    <dgm:cxn modelId="{D086A9A8-7789-49D0-9725-DD6D48CA19BB}" type="presOf" srcId="{AFD31390-6AC1-4FA3-BAED-940C68F6DC88}" destId="{DE5A9EAF-482B-4BF2-AF77-13EAE24C70B0}" srcOrd="0" destOrd="0" presId="urn:microsoft.com/office/officeart/2005/8/layout/hierarchy6"/>
+    <dgm:cxn modelId="{0B53E737-930F-4A30-A756-CEC173CEB6F5}" type="presOf" srcId="{5FF24799-9D94-4C82-BD4D-140D4015CB2B}" destId="{ED59F7BD-492C-44FF-BA19-C9825A4FB025}" srcOrd="0" destOrd="0" presId="urn:microsoft.com/office/officeart/2005/8/layout/hierarchy6"/>
+    <dgm:cxn modelId="{2C2A58B9-C1C1-4E99-8F9F-57F5352C17B3}" srcId="{32F57AC1-33E6-4385-87AA-54CA417DA641}" destId="{F9BF59C0-DF44-4744-B321-308C735D2948}" srcOrd="1" destOrd="0" parTransId="{27D2D03C-6B7C-48CB-A639-65E257CC0E96}" sibTransId="{621FCEB5-3DC7-49FE-9793-8D4BC0648D86}"/>
+    <dgm:cxn modelId="{4340BBD9-F147-4868-A593-8F321E8FEA59}" type="presOf" srcId="{32F57AC1-33E6-4385-87AA-54CA417DA641}" destId="{6C530A79-90C4-49C8-A5F2-23392F853946}" srcOrd="0" destOrd="0" presId="urn:microsoft.com/office/officeart/2005/8/layout/hierarchy6"/>
+    <dgm:cxn modelId="{83A1B468-4A43-4490-A2DA-92D22DB37744}" type="presOf" srcId="{F9BF59C0-DF44-4744-B321-308C735D2948}" destId="{8282B123-79D2-4E0A-BF9E-E258F9155E15}" srcOrd="0" destOrd="0" presId="urn:microsoft.com/office/officeart/2005/8/layout/hierarchy6"/>
     <dgm:cxn modelId="{2130979F-3F39-4F08-9231-5AE49894D433}" type="presOf" srcId="{CB4D62B7-20A0-42CA-B7A0-532513CCE3B9}" destId="{6B9BE3B4-6371-45FE-A71C-6E55CC800E74}" srcOrd="0" destOrd="0" presId="urn:microsoft.com/office/officeart/2005/8/layout/hierarchy6"/>
-    <dgm:cxn modelId="{A921FEE1-3680-4325-A960-B1C084F9E9E9}" type="presOf" srcId="{8D5FDD50-92B6-484D-9F33-ECBEC3DBA967}" destId="{28B760FA-B381-41EC-8B4D-492CAB381BC4}" srcOrd="0" destOrd="0" presId="urn:microsoft.com/office/officeart/2005/8/layout/hierarchy6"/>
-    <dgm:cxn modelId="{B7FE826E-C8F9-4876-9637-074B49B81DF4}" type="presOf" srcId="{5AC319E5-1379-4860-865D-82CA5F8F6D74}" destId="{6C9A0E75-2E9F-4357-954E-2D66B9CAC58C}" srcOrd="0" destOrd="0" presId="urn:microsoft.com/office/officeart/2005/8/layout/hierarchy6"/>
-    <dgm:cxn modelId="{0B53E737-930F-4A30-A756-CEC173CEB6F5}" type="presOf" srcId="{5FF24799-9D94-4C82-BD4D-140D4015CB2B}" destId="{ED59F7BD-492C-44FF-BA19-C9825A4FB025}" srcOrd="0" destOrd="0" presId="urn:microsoft.com/office/officeart/2005/8/layout/hierarchy6"/>
-    <dgm:cxn modelId="{C32FD768-55FE-4BD7-8170-F539FBEB6EEE}" type="presOf" srcId="{ED7F2F8B-596F-4ACC-88C7-425BD0C69125}" destId="{382C07DB-DF31-4C35-A8A6-001339A6AF65}" srcOrd="0" destOrd="0" presId="urn:microsoft.com/office/officeart/2005/8/layout/hierarchy6"/>
-    <dgm:cxn modelId="{5759436E-0925-4D61-A8DD-C88825E506BA}" srcId="{8D5FDD50-92B6-484D-9F33-ECBEC3DBA967}" destId="{32F57AC1-33E6-4385-87AA-54CA417DA641}" srcOrd="0" destOrd="0" parTransId="{4CF32539-B159-4D5B-8813-0F2517A92619}" sibTransId="{1D3139AF-ED12-4B35-986A-3B8D78646C94}"/>
-    <dgm:cxn modelId="{4DB2AC0F-39E4-401D-8E5C-59CAB2B05FD6}" srcId="{32F57AC1-33E6-4385-87AA-54CA417DA641}" destId="{AFD31390-6AC1-4FA3-BAED-940C68F6DC88}" srcOrd="0" destOrd="0" parTransId="{5FF24799-9D94-4C82-BD4D-140D4015CB2B}" sibTransId="{419E9FC1-BC4A-4460-8112-FCFA3CD98EFD}"/>
-    <dgm:cxn modelId="{B001E01C-AF69-4B79-A4F1-94C26395D088}" srcId="{AFD31390-6AC1-4FA3-BAED-940C68F6DC88}" destId="{ED7F2F8B-596F-4ACC-88C7-425BD0C69125}" srcOrd="0" destOrd="0" parTransId="{CB4D62B7-20A0-42CA-B7A0-532513CCE3B9}" sibTransId="{57829ED3-75E3-4323-A3BE-308A2C52FF80}"/>
-    <dgm:cxn modelId="{83A1B468-4A43-4490-A2DA-92D22DB37744}" type="presOf" srcId="{F9BF59C0-DF44-4744-B321-308C735D2948}" destId="{8282B123-79D2-4E0A-BF9E-E258F9155E15}" srcOrd="0" destOrd="0" presId="urn:microsoft.com/office/officeart/2005/8/layout/hierarchy6"/>
-    <dgm:cxn modelId="{CF03D959-2934-4325-9B63-D757920D2C0E}" type="presOf" srcId="{27D2D03C-6B7C-48CB-A639-65E257CC0E96}" destId="{F1E4FA91-E817-4642-B67C-69461E749193}" srcOrd="0" destOrd="0" presId="urn:microsoft.com/office/officeart/2005/8/layout/hierarchy6"/>
-    <dgm:cxn modelId="{D086A9A8-7789-49D0-9725-DD6D48CA19BB}" type="presOf" srcId="{AFD31390-6AC1-4FA3-BAED-940C68F6DC88}" destId="{DE5A9EAF-482B-4BF2-AF77-13EAE24C70B0}" srcOrd="0" destOrd="0" presId="urn:microsoft.com/office/officeart/2005/8/layout/hierarchy6"/>
-    <dgm:cxn modelId="{4340BBD9-F147-4868-A593-8F321E8FEA59}" type="presOf" srcId="{32F57AC1-33E6-4385-87AA-54CA417DA641}" destId="{6C530A79-90C4-49C8-A5F2-23392F853946}" srcOrd="0" destOrd="0" presId="urn:microsoft.com/office/officeart/2005/8/layout/hierarchy6"/>
+    <dgm:cxn modelId="{5C5643DF-501E-4C4D-AD3C-AE8B6623289F}" srcId="{F9BF59C0-DF44-4744-B321-308C735D2948}" destId="{5AC319E5-1379-4860-865D-82CA5F8F6D74}" srcOrd="0" destOrd="0" parTransId="{796B1FE4-BA91-4115-9C79-7C9D8BC050E3}" sibTransId="{80556F87-8DB5-487B-B9F7-E91301DA1B52}"/>
     <dgm:cxn modelId="{9B0F5CF1-0373-4ABE-A5A9-D8141A536AEA}" type="presOf" srcId="{796B1FE4-BA91-4115-9C79-7C9D8BC050E3}" destId="{CEA2203F-6CE8-44B9-9465-03032392CF78}" srcOrd="0" destOrd="0" presId="urn:microsoft.com/office/officeart/2005/8/layout/hierarchy6"/>
-    <dgm:cxn modelId="{2C2A58B9-C1C1-4E99-8F9F-57F5352C17B3}" srcId="{32F57AC1-33E6-4385-87AA-54CA417DA641}" destId="{F9BF59C0-DF44-4744-B321-308C735D2948}" srcOrd="1" destOrd="0" parTransId="{27D2D03C-6B7C-48CB-A639-65E257CC0E96}" sibTransId="{621FCEB5-3DC7-49FE-9793-8D4BC0648D86}"/>
-    <dgm:cxn modelId="{5C5643DF-501E-4C4D-AD3C-AE8B6623289F}" srcId="{F9BF59C0-DF44-4744-B321-308C735D2948}" destId="{5AC319E5-1379-4860-865D-82CA5F8F6D74}" srcOrd="0" destOrd="0" parTransId="{796B1FE4-BA91-4115-9C79-7C9D8BC050E3}" sibTransId="{80556F87-8DB5-487B-B9F7-E91301DA1B52}"/>
     <dgm:cxn modelId="{91E0F08D-A6C9-4AA9-911E-5DA8688AC380}" type="presParOf" srcId="{28B760FA-B381-41EC-8B4D-492CAB381BC4}" destId="{3B16B6A1-0DAE-46FF-8BBD-EDBC7A332D6C}" srcOrd="0" destOrd="0" presId="urn:microsoft.com/office/officeart/2005/8/layout/hierarchy6"/>
     <dgm:cxn modelId="{E595E52D-E0E5-44E1-AAEF-DCFA52313DD3}" type="presParOf" srcId="{3B16B6A1-0DAE-46FF-8BBD-EDBC7A332D6C}" destId="{010D124E-7220-40C4-B1FE-D515AE2A5227}" srcOrd="0" destOrd="0" presId="urn:microsoft.com/office/officeart/2005/8/layout/hierarchy6"/>
     <dgm:cxn modelId="{9A86ED24-F5FB-49F9-8C65-0DAA5FDBE8A4}" type="presParOf" srcId="{010D124E-7220-40C4-B1FE-D515AE2A5227}" destId="{D546113F-0EE7-47CB-AF4A-7B882A2C2C6B}" srcOrd="0" destOrd="0" presId="urn:microsoft.com/office/officeart/2005/8/layout/hierarchy6"/>
@@ -21082,11 +21348,7 @@
             <a:pPr lvl="1"/>
             <a:r>
               <a:rPr lang="pt-BR" dirty="0" smtClean="0"/>
-              <a:t>acima-abaixo </a:t>
-            </a:r>
-            <a:r>
-              <a:rPr lang="pt-BR" dirty="0" smtClean="0"/>
-              <a:t>(</a:t>
+              <a:t>acima-abaixo (</a:t>
             </a:r>
             <a:r>
               <a:rPr lang="en-US" i="1" dirty="0" smtClean="0"/>
@@ -21121,7 +21383,6 @@
               <a:rPr lang="pt-BR" dirty="0" smtClean="0"/>
               <a:t> Compressão</a:t>
             </a:r>
-            <a:endParaRPr lang="pt-BR" dirty="0" smtClean="0"/>
           </a:p>
           <a:p>
             <a:pPr marL="0" indent="0">
@@ -21406,17 +21667,8 @@
           <a:p>
             <a:r>
               <a:rPr lang="pt-BR" dirty="0" smtClean="0"/>
-              <a:t>Apenas </a:t>
-            </a:r>
-            <a:r>
-              <a:rPr lang="pt-BR" dirty="0" smtClean="0"/>
-              <a:t>um </a:t>
-            </a:r>
-            <a:r>
-              <a:rPr lang="pt-BR" dirty="0" smtClean="0"/>
-              <a:t>vídeo</a:t>
-            </a:r>
-            <a:endParaRPr lang="pt-BR" dirty="0" smtClean="0"/>
+              <a:t>Apenas um vídeo</a:t>
+            </a:r>
           </a:p>
           <a:p>
             <a:r>
@@ -22235,16 +22487,8 @@
               <a:t> – </a:t>
             </a:r>
             <a:r>
-              <a:rPr lang="en-US" i="1" dirty="0" err="1" smtClean="0"/>
-              <a:t>worldline</a:t>
-            </a:r>
-            <a:r>
               <a:rPr lang="en-US" i="1" dirty="0" smtClean="0"/>
-              <a:t> </a:t>
-            </a:r>
-            <a:r>
-              <a:rPr lang="en-US" i="1" dirty="0" smtClean="0"/>
-              <a:t>correlation</a:t>
+              <a:t>worldline correlation</a:t>
             </a:r>
           </a:p>
           <a:p>
@@ -22253,7 +22497,6 @@
               <a:rPr lang="pt-BR" dirty="0" smtClean="0"/>
               <a:t>Semelhante à compressão temporal</a:t>
             </a:r>
-            <a:endParaRPr lang="pt-BR" dirty="0" smtClean="0"/>
           </a:p>
         </p:txBody>
       </p:sp>
@@ -23090,11 +23333,7 @@
             <a:pPr lvl="1"/>
             <a:r>
               <a:rPr lang="pt-BR" dirty="0" smtClean="0"/>
-              <a:t>Desenvolver </a:t>
-            </a:r>
-            <a:r>
-              <a:rPr lang="pt-BR" dirty="0" smtClean="0"/>
-              <a:t>um método de codificação exclusivo para vídeos estereoscópicos</a:t>
+              <a:t>Desenvolver um método de codificação exclusivo para vídeos estereoscópicos</a:t>
             </a:r>
           </a:p>
           <a:p>
@@ -23112,15 +23351,7 @@
             <a:pPr lvl="3"/>
             <a:r>
               <a:rPr lang="pt-BR" dirty="0" smtClean="0"/>
-              <a:t>Sem </a:t>
-            </a:r>
-            <a:r>
-              <a:rPr lang="pt-BR" dirty="0" smtClean="0"/>
-              <a:t>afetar a </a:t>
-            </a:r>
-            <a:r>
-              <a:rPr lang="pt-BR" dirty="0" smtClean="0"/>
-              <a:t>percepção de profundidade</a:t>
+              <a:t>Sem afetar a percepção de profundidade</a:t>
             </a:r>
           </a:p>
           <a:p>
@@ -23677,7 +23908,7 @@
           <a:lstStyle/>
           <a:p>
             <a:pPr algn="ctr"/>
-            <a:endParaRPr lang="pt-BR"/>
+            <a:endParaRPr lang="pt-BR" dirty="0"/>
           </a:p>
         </p:txBody>
       </p:sp>
@@ -24193,11 +24424,7 @@
             <a:pPr lvl="1"/>
             <a:r>
               <a:rPr lang="pt-BR" dirty="0" smtClean="0"/>
-              <a:t>Recuperar canais de cor removidos na transformação </a:t>
-            </a:r>
-            <a:r>
-              <a:rPr lang="pt-BR" dirty="0" smtClean="0"/>
-              <a:t>anaglífica</a:t>
+              <a:t>Recuperar canais de cor removidos na transformação anaglífica</a:t>
             </a:r>
           </a:p>
           <a:p>
@@ -24272,11 +24499,7 @@
           <a:p>
             <a:r>
               <a:rPr lang="pt-BR" dirty="0" smtClean="0"/>
-              <a:t>Proposta de Pesquisa – </a:t>
-            </a:r>
-            <a:r>
-              <a:rPr lang="pt-BR" dirty="0" smtClean="0"/>
-              <a:t>Cronograma de atividades</a:t>
+              <a:t>Proposta de Pesquisa – Cronograma de atividades</a:t>
             </a:r>
             <a:endParaRPr lang="pt-BR" dirty="0"/>
           </a:p>
@@ -24595,7 +24818,7 @@
           <a:lstStyle/>
           <a:p>
             <a:pPr algn="ctr"/>
-            <a:endParaRPr lang="pt-BR"/>
+            <a:endParaRPr lang="pt-BR" dirty="0"/>
           </a:p>
         </p:txBody>
       </p:sp>
@@ -24636,7 +24859,7 @@
           <a:lstStyle/>
           <a:p>
             <a:pPr algn="ctr"/>
-            <a:endParaRPr lang="pt-BR"/>
+            <a:endParaRPr lang="pt-BR" dirty="0"/>
           </a:p>
         </p:txBody>
       </p:sp>
@@ -24663,12 +24886,20 @@
           <a:lstStyle/>
           <a:p>
             <a:r>
-              <a:rPr lang="pt-BR" dirty="0" err="1" smtClean="0"/>
-              <a:t>Ago</a:t>
-            </a:r>
-            <a:r>
               <a:rPr lang="pt-BR" dirty="0" smtClean="0"/>
-              <a:t>/2010 - Set/2011</a:t>
+              <a:t>Ago./</a:t>
+            </a:r>
+            <a:r>
+              <a:rPr lang="pt-BR" dirty="0" smtClean="0"/>
+              <a:t>2010 </a:t>
+            </a:r>
+            <a:r>
+              <a:rPr lang="pt-BR" dirty="0" smtClean="0"/>
+              <a:t>- Set./</a:t>
+            </a:r>
+            <a:r>
+              <a:rPr lang="pt-BR" dirty="0" smtClean="0"/>
+              <a:t>2011</a:t>
             </a:r>
             <a:endParaRPr lang="pt-BR" dirty="0"/>
           </a:p>
@@ -24698,15 +24929,19 @@
           <a:p>
             <a:r>
               <a:rPr lang="pt-BR" dirty="0" smtClean="0"/>
-              <a:t>Set/2011 - </a:t>
-            </a:r>
-            <a:r>
-              <a:rPr lang="pt-BR" dirty="0" err="1" smtClean="0"/>
-              <a:t>Ago</a:t>
+              <a:t>Set./</a:t>
             </a:r>
             <a:r>
               <a:rPr lang="pt-BR" dirty="0" smtClean="0"/>
-              <a:t>/2012</a:t>
+              <a:t>2011 - </a:t>
+            </a:r>
+            <a:r>
+              <a:rPr lang="pt-BR" dirty="0" smtClean="0"/>
+              <a:t>Ago./</a:t>
+            </a:r>
+            <a:r>
+              <a:rPr lang="pt-BR" dirty="0" smtClean="0"/>
+              <a:t>2012</a:t>
             </a:r>
             <a:endParaRPr lang="pt-BR" dirty="0"/>
           </a:p>
@@ -25262,11 +25497,7 @@
             </a:r>
             <a:r>
               <a:rPr lang="pt-BR" b="1" dirty="0" smtClean="0"/>
-              <a:t>Tabela de Índice de </a:t>
-            </a:r>
-            <a:r>
-              <a:rPr lang="pt-BR" b="1" dirty="0" smtClean="0"/>
-              <a:t>Cores</a:t>
+              <a:t>Tabela de Índice de Cores</a:t>
             </a:r>
           </a:p>
         </p:txBody>
@@ -31281,14 +31512,7 @@
                 <a:ea typeface="Microsoft YaHei" pitchFamily="2"/>
                 <a:cs typeface="Mangal" pitchFamily="2"/>
               </a:rPr>
-              <a:t>Acesso </a:t>
-            </a:r>
-            <a:r>
-              <a:rPr lang="pt-BR" dirty="0" smtClean="0">
-                <a:ea typeface="Microsoft YaHei" pitchFamily="2"/>
-                <a:cs typeface="Mangal" pitchFamily="2"/>
-              </a:rPr>
-              <a:t>em 14 de setembro de 2011</a:t>
+              <a:t>Acesso em 14 de setembro de 2011</a:t>
             </a:r>
             <a:endParaRPr lang="pt-BR" dirty="0">
               <a:ea typeface="Microsoft YaHei" pitchFamily="2"/>
@@ -32462,11 +32686,7 @@
             <a:pPr lvl="1"/>
             <a:r>
               <a:rPr lang="pt-BR" dirty="0" smtClean="0"/>
-              <a:t>Redução de metade do volume de dados → compress</a:t>
-            </a:r>
-            <a:r>
-              <a:rPr lang="pt-BR" dirty="0" smtClean="0"/>
-              <a:t>ão</a:t>
+              <a:t>Redução de metade do volume de dados → compressão</a:t>
             </a:r>
             <a:endParaRPr lang="pt-BR" dirty="0"/>
           </a:p>
@@ -32760,26 +32980,17 @@
               <a:rPr lang="pt-BR" sz="1900" dirty="0" smtClean="0"/>
               <a:t>Sem necessidade de equipamento especial</a:t>
             </a:r>
-            <a:endParaRPr lang="pt-BR" sz="1900" dirty="0" smtClean="0"/>
           </a:p>
           <a:p>
             <a:r>
               <a:rPr lang="pt-BR" sz="2200" dirty="0" smtClean="0"/>
-              <a:t>Fusão das duas imagens </a:t>
-            </a:r>
+              <a:t>Fusão das duas imagens do par estéreo</a:t>
+            </a:r>
+          </a:p>
+          <a:p>
             <a:r>
               <a:rPr lang="pt-BR" sz="2200" dirty="0" smtClean="0"/>
-              <a:t>do par estéreo</a:t>
-            </a:r>
-          </a:p>
-          <a:p>
-            <a:r>
-              <a:rPr lang="pt-BR" sz="2200" dirty="0" smtClean="0"/>
-              <a:t>Óculos </a:t>
-            </a:r>
-            <a:r>
-              <a:rPr lang="pt-BR" sz="2200" dirty="0" smtClean="0"/>
-              <a:t>especiais com lentes semelhantes → filtro</a:t>
+              <a:t>Óculos especiais com lentes semelhantes → filtro</a:t>
             </a:r>
           </a:p>
         </p:txBody>

</xml_diff>